<commit_message>
working on temporal alignment screening
</commit_message>
<xml_diff>
--- a/VRI_bird_data_scenarios.pptx
+++ b/VRI_bird_data_scenarios.pptx
@@ -245,7 +245,7 @@
           <a:p>
             <a:fld id="{2D5072A0-6F4A-496D-BC20-1C16D5D961A8}" type="datetimeFigureOut">
               <a:rPr lang="en-US" smtClean="0"/>
-              <a:t>12/22/2017</a:t>
+              <a:t>12/29/2017</a:t>
             </a:fld>
             <a:endParaRPr lang="en-US"/>
           </a:p>
@@ -415,7 +415,7 @@
           <a:p>
             <a:fld id="{2D5072A0-6F4A-496D-BC20-1C16D5D961A8}" type="datetimeFigureOut">
               <a:rPr lang="en-US" smtClean="0"/>
-              <a:t>12/22/2017</a:t>
+              <a:t>12/29/2017</a:t>
             </a:fld>
             <a:endParaRPr lang="en-US"/>
           </a:p>
@@ -595,7 +595,7 @@
           <a:p>
             <a:fld id="{2D5072A0-6F4A-496D-BC20-1C16D5D961A8}" type="datetimeFigureOut">
               <a:rPr lang="en-US" smtClean="0"/>
-              <a:t>12/22/2017</a:t>
+              <a:t>12/29/2017</a:t>
             </a:fld>
             <a:endParaRPr lang="en-US"/>
           </a:p>
@@ -765,7 +765,7 @@
           <a:p>
             <a:fld id="{2D5072A0-6F4A-496D-BC20-1C16D5D961A8}" type="datetimeFigureOut">
               <a:rPr lang="en-US" smtClean="0"/>
-              <a:t>12/22/2017</a:t>
+              <a:t>12/29/2017</a:t>
             </a:fld>
             <a:endParaRPr lang="en-US"/>
           </a:p>
@@ -1011,7 +1011,7 @@
           <a:p>
             <a:fld id="{2D5072A0-6F4A-496D-BC20-1C16D5D961A8}" type="datetimeFigureOut">
               <a:rPr lang="en-US" smtClean="0"/>
-              <a:t>12/22/2017</a:t>
+              <a:t>12/29/2017</a:t>
             </a:fld>
             <a:endParaRPr lang="en-US"/>
           </a:p>
@@ -1243,7 +1243,7 @@
           <a:p>
             <a:fld id="{2D5072A0-6F4A-496D-BC20-1C16D5D961A8}" type="datetimeFigureOut">
               <a:rPr lang="en-US" smtClean="0"/>
-              <a:t>12/22/2017</a:t>
+              <a:t>12/29/2017</a:t>
             </a:fld>
             <a:endParaRPr lang="en-US"/>
           </a:p>
@@ -1610,7 +1610,7 @@
           <a:p>
             <a:fld id="{2D5072A0-6F4A-496D-BC20-1C16D5D961A8}" type="datetimeFigureOut">
               <a:rPr lang="en-US" smtClean="0"/>
-              <a:t>12/22/2017</a:t>
+              <a:t>12/29/2017</a:t>
             </a:fld>
             <a:endParaRPr lang="en-US"/>
           </a:p>
@@ -1728,7 +1728,7 @@
           <a:p>
             <a:fld id="{2D5072A0-6F4A-496D-BC20-1C16D5D961A8}" type="datetimeFigureOut">
               <a:rPr lang="en-US" smtClean="0"/>
-              <a:t>12/22/2017</a:t>
+              <a:t>12/29/2017</a:t>
             </a:fld>
             <a:endParaRPr lang="en-US"/>
           </a:p>
@@ -1823,7 +1823,7 @@
           <a:p>
             <a:fld id="{2D5072A0-6F4A-496D-BC20-1C16D5D961A8}" type="datetimeFigureOut">
               <a:rPr lang="en-US" smtClean="0"/>
-              <a:t>12/22/2017</a:t>
+              <a:t>12/29/2017</a:t>
             </a:fld>
             <a:endParaRPr lang="en-US"/>
           </a:p>
@@ -2100,7 +2100,7 @@
           <a:p>
             <a:fld id="{2D5072A0-6F4A-496D-BC20-1C16D5D961A8}" type="datetimeFigureOut">
               <a:rPr lang="en-US" smtClean="0"/>
-              <a:t>12/22/2017</a:t>
+              <a:t>12/29/2017</a:t>
             </a:fld>
             <a:endParaRPr lang="en-US"/>
           </a:p>
@@ -2353,7 +2353,7 @@
           <a:p>
             <a:fld id="{2D5072A0-6F4A-496D-BC20-1C16D5D961A8}" type="datetimeFigureOut">
               <a:rPr lang="en-US" smtClean="0"/>
-              <a:t>12/22/2017</a:t>
+              <a:t>12/29/2017</a:t>
             </a:fld>
             <a:endParaRPr lang="en-US"/>
           </a:p>
@@ -2566,7 +2566,7 @@
           <a:p>
             <a:fld id="{2D5072A0-6F4A-496D-BC20-1C16D5D961A8}" type="datetimeFigureOut">
               <a:rPr lang="en-US" smtClean="0"/>
-              <a:t>12/22/2017</a:t>
+              <a:t>12/29/2017</a:t>
             </a:fld>
             <a:endParaRPr lang="en-US"/>
           </a:p>
@@ -4166,13 +4166,7 @@
               <a:rPr lang="en-CA" sz="1400" dirty="0" smtClean="0">
                 <a:sym typeface="Wingdings" panose="05000000000000000000" pitchFamily="2" charset="2"/>
               </a:rPr>
-              <a:t> GOOD: Bird survey and inventory both likely represent post-disturbance </a:t>
-            </a:r>
-            <a:r>
-              <a:rPr lang="en-CA" sz="1400" dirty="0" smtClean="0">
-                <a:sym typeface="Wingdings" panose="05000000000000000000" pitchFamily="2" charset="2"/>
-              </a:rPr>
-              <a:t>conditions </a:t>
+              <a:t> GOOD: Bird survey and inventory both likely represent post-disturbance conditions </a:t>
             </a:r>
             <a:endParaRPr lang="en-US" sz="1400" dirty="0"/>
           </a:p>

</xml_diff>

<commit_message>
re-doing analysis after new offset calculation
</commit_message>
<xml_diff>
--- a/VRI_bird_data_scenarios.pptx
+++ b/VRI_bird_data_scenarios.pptx
@@ -9,6 +9,8 @@
     <p:sldId id="259" r:id="rId3"/>
     <p:sldId id="260" r:id="rId4"/>
     <p:sldId id="257" r:id="rId5"/>
+    <p:sldId id="261" r:id="rId6"/>
+    <p:sldId id="262" r:id="rId7"/>
   </p:sldIdLst>
   <p:sldSz cx="12192000" cy="6858000"/>
   <p:notesSz cx="6858000" cy="9144000"/>
@@ -246,7 +248,7 @@
           <a:p>
             <a:fld id="{2D5072A0-6F4A-496D-BC20-1C16D5D961A8}" type="datetimeFigureOut">
               <a:rPr lang="en-US" smtClean="0"/>
-              <a:t>1/1/2018</a:t>
+              <a:t>1/8/2018</a:t>
             </a:fld>
             <a:endParaRPr lang="en-US"/>
           </a:p>
@@ -416,7 +418,7 @@
           <a:p>
             <a:fld id="{2D5072A0-6F4A-496D-BC20-1C16D5D961A8}" type="datetimeFigureOut">
               <a:rPr lang="en-US" smtClean="0"/>
-              <a:t>1/1/2018</a:t>
+              <a:t>1/8/2018</a:t>
             </a:fld>
             <a:endParaRPr lang="en-US"/>
           </a:p>
@@ -596,7 +598,7 @@
           <a:p>
             <a:fld id="{2D5072A0-6F4A-496D-BC20-1C16D5D961A8}" type="datetimeFigureOut">
               <a:rPr lang="en-US" smtClean="0"/>
-              <a:t>1/1/2018</a:t>
+              <a:t>1/8/2018</a:t>
             </a:fld>
             <a:endParaRPr lang="en-US"/>
           </a:p>
@@ -766,7 +768,7 @@
           <a:p>
             <a:fld id="{2D5072A0-6F4A-496D-BC20-1C16D5D961A8}" type="datetimeFigureOut">
               <a:rPr lang="en-US" smtClean="0"/>
-              <a:t>1/1/2018</a:t>
+              <a:t>1/8/2018</a:t>
             </a:fld>
             <a:endParaRPr lang="en-US"/>
           </a:p>
@@ -1012,7 +1014,7 @@
           <a:p>
             <a:fld id="{2D5072A0-6F4A-496D-BC20-1C16D5D961A8}" type="datetimeFigureOut">
               <a:rPr lang="en-US" smtClean="0"/>
-              <a:t>1/1/2018</a:t>
+              <a:t>1/8/2018</a:t>
             </a:fld>
             <a:endParaRPr lang="en-US"/>
           </a:p>
@@ -1244,7 +1246,7 @@
           <a:p>
             <a:fld id="{2D5072A0-6F4A-496D-BC20-1C16D5D961A8}" type="datetimeFigureOut">
               <a:rPr lang="en-US" smtClean="0"/>
-              <a:t>1/1/2018</a:t>
+              <a:t>1/8/2018</a:t>
             </a:fld>
             <a:endParaRPr lang="en-US"/>
           </a:p>
@@ -1611,7 +1613,7 @@
           <a:p>
             <a:fld id="{2D5072A0-6F4A-496D-BC20-1C16D5D961A8}" type="datetimeFigureOut">
               <a:rPr lang="en-US" smtClean="0"/>
-              <a:t>1/1/2018</a:t>
+              <a:t>1/8/2018</a:t>
             </a:fld>
             <a:endParaRPr lang="en-US"/>
           </a:p>
@@ -1729,7 +1731,7 @@
           <a:p>
             <a:fld id="{2D5072A0-6F4A-496D-BC20-1C16D5D961A8}" type="datetimeFigureOut">
               <a:rPr lang="en-US" smtClean="0"/>
-              <a:t>1/1/2018</a:t>
+              <a:t>1/8/2018</a:t>
             </a:fld>
             <a:endParaRPr lang="en-US"/>
           </a:p>
@@ -1824,7 +1826,7 @@
           <a:p>
             <a:fld id="{2D5072A0-6F4A-496D-BC20-1C16D5D961A8}" type="datetimeFigureOut">
               <a:rPr lang="en-US" smtClean="0"/>
-              <a:t>1/1/2018</a:t>
+              <a:t>1/8/2018</a:t>
             </a:fld>
             <a:endParaRPr lang="en-US"/>
           </a:p>
@@ -2101,7 +2103,7 @@
           <a:p>
             <a:fld id="{2D5072A0-6F4A-496D-BC20-1C16D5D961A8}" type="datetimeFigureOut">
               <a:rPr lang="en-US" smtClean="0"/>
-              <a:t>1/1/2018</a:t>
+              <a:t>1/8/2018</a:t>
             </a:fld>
             <a:endParaRPr lang="en-US"/>
           </a:p>
@@ -2354,7 +2356,7 @@
           <a:p>
             <a:fld id="{2D5072A0-6F4A-496D-BC20-1C16D5D961A8}" type="datetimeFigureOut">
               <a:rPr lang="en-US" smtClean="0"/>
-              <a:t>1/1/2018</a:t>
+              <a:t>1/8/2018</a:t>
             </a:fld>
             <a:endParaRPr lang="en-US"/>
           </a:p>
@@ -2567,7 +2569,7 @@
           <a:p>
             <a:fld id="{2D5072A0-6F4A-496D-BC20-1C16D5D961A8}" type="datetimeFigureOut">
               <a:rPr lang="en-US" smtClean="0"/>
-              <a:t>1/1/2018</a:t>
+              <a:t>1/8/2018</a:t>
             </a:fld>
             <a:endParaRPr lang="en-US"/>
           </a:p>
@@ -3499,25 +3501,7 @@
                 <a:rPr lang="en-CA" sz="1400" dirty="0" smtClean="0">
                   <a:sym typeface="Wingdings" panose="05000000000000000000" pitchFamily="2" charset="2"/>
                 </a:rPr>
-                <a:t> </a:t>
-              </a:r>
-              <a:r>
-                <a:rPr lang="en-CA" sz="1400" dirty="0" smtClean="0">
-                  <a:sym typeface="Wingdings" panose="05000000000000000000" pitchFamily="2" charset="2"/>
-                </a:rPr>
-                <a:t>GOOD: Bird survey </a:t>
-              </a:r>
-              <a:r>
-                <a:rPr lang="en-CA" sz="1400" dirty="0" smtClean="0">
-                  <a:sym typeface="Wingdings" panose="05000000000000000000" pitchFamily="2" charset="2"/>
-                </a:rPr>
-                <a:t>represents </a:t>
-              </a:r>
-              <a:r>
-                <a:rPr lang="en-CA" sz="1400" dirty="0" smtClean="0">
-                  <a:sym typeface="Wingdings" panose="05000000000000000000" pitchFamily="2" charset="2"/>
-                </a:rPr>
-                <a:t>post-disturbance conditions </a:t>
+                <a:t> GOOD: Bird survey represents post-disturbance conditions </a:t>
               </a:r>
               <a:endParaRPr lang="en-US" sz="1400" dirty="0"/>
             </a:p>
@@ -4034,7 +4018,6 @@
                 <a:rPr lang="en-CA" sz="1400" dirty="0" smtClean="0"/>
                 <a:t>A disturbance occurred after the inventory and before the bird survey. </a:t>
               </a:r>
-              <a:endParaRPr lang="en-CA" sz="1400" dirty="0" smtClean="0"/>
             </a:p>
             <a:p>
               <a:r>
@@ -4075,13 +4058,7 @@
                 <a:rPr lang="en-CA" sz="1400" dirty="0" smtClean="0">
                   <a:sym typeface="Wingdings" panose="05000000000000000000" pitchFamily="2" charset="2"/>
                 </a:rPr>
-                <a:t> </a:t>
-              </a:r>
-              <a:r>
-                <a:rPr lang="en-CA" sz="1400" dirty="0" smtClean="0">
-                  <a:sym typeface="Wingdings" panose="05000000000000000000" pitchFamily="2" charset="2"/>
-                </a:rPr>
-                <a:t>PROBABLE</a:t>
+                <a:t> PROBABLE</a:t>
               </a:r>
               <a:r>
                 <a:rPr lang="en-CA" sz="1400" dirty="0" smtClean="0"/>
@@ -4379,19 +4356,7 @@
                 <a:rPr lang="en-CA" sz="1400" dirty="0" smtClean="0">
                   <a:sym typeface="Wingdings" panose="05000000000000000000" pitchFamily="2" charset="2"/>
                 </a:rPr>
-                <a:t> ALMOST </a:t>
-              </a:r>
-              <a:r>
-                <a:rPr lang="en-CA" sz="1400" dirty="0" smtClean="0">
-                  <a:sym typeface="Wingdings" panose="05000000000000000000" pitchFamily="2" charset="2"/>
-                </a:rPr>
-                <a:t>CERTAIN MISMATCH: The inventory reflects the post-disturbance conditions, but bird survey represents pre-disturbance conditions</a:t>
-              </a:r>
-              <a:r>
-                <a:rPr lang="en-CA" sz="1400" dirty="0" smtClean="0">
-                  <a:sym typeface="Wingdings" panose="05000000000000000000" pitchFamily="2" charset="2"/>
-                </a:rPr>
-                <a:t>.</a:t>
+                <a:t> ALMOST CERTAIN MISMATCH: The inventory reflects the post-disturbance conditions, but bird survey represents pre-disturbance conditions.</a:t>
               </a:r>
             </a:p>
           </p:txBody>
@@ -4940,11 +4905,7 @@
             <a:p>
               <a:r>
                 <a:rPr lang="en-CA" sz="1400" dirty="0" smtClean="0"/>
-                <a:t>Disturbance occurred after </a:t>
-              </a:r>
-              <a:r>
-                <a:rPr lang="en-CA" sz="1400" dirty="0" smtClean="0"/>
-                <a:t>the inventory, but in the same year as the bird survey. </a:t>
+                <a:t>Disturbance occurred after the inventory, but in the same year as the bird survey. </a:t>
               </a:r>
             </a:p>
             <a:p>
@@ -4986,11 +4947,7 @@
               </a:r>
               <a:r>
                 <a:rPr lang="en-CA" sz="1400" dirty="0" smtClean="0"/>
-                <a:t>POSSIBLE MISMATCH: </a:t>
-              </a:r>
-              <a:r>
-                <a:rPr lang="en-CA" sz="1400" dirty="0" smtClean="0"/>
-                <a:t>We don’t know if the bird survey was pre or post-disturbance, so best to exclude these. </a:t>
+                <a:t>POSSIBLE MISMATCH: We don’t know if the bird survey was pre or post-disturbance, so best to exclude these. </a:t>
               </a:r>
               <a:endParaRPr lang="en-US" sz="1400" dirty="0"/>
             </a:p>
@@ -5666,11 +5623,7 @@
           <a:p>
             <a:r>
               <a:rPr lang="en-CA" sz="1400" dirty="0" smtClean="0"/>
-              <a:t>Disturbance occurred after both the inventory and the bird data</a:t>
-            </a:r>
-            <a:r>
-              <a:rPr lang="en-CA" sz="1400" dirty="0" smtClean="0"/>
-              <a:t>.</a:t>
+              <a:t>Disturbance occurred after both the inventory and the bird data.</a:t>
             </a:r>
           </a:p>
           <a:p>
@@ -5704,13 +5657,7 @@
               <a:rPr lang="en-CA" sz="1400" dirty="0" smtClean="0">
                 <a:sym typeface="Wingdings" panose="05000000000000000000" pitchFamily="2" charset="2"/>
               </a:rPr>
-              <a:t> </a:t>
-            </a:r>
-            <a:r>
-              <a:rPr lang="en-CA" sz="1400" dirty="0" smtClean="0">
-                <a:sym typeface="Wingdings" panose="05000000000000000000" pitchFamily="2" charset="2"/>
-              </a:rPr>
-              <a:t>PROBABLY GOOD: Bird data and inventory data collected under similar conditions. I</a:t>
+              <a:t> PROBABLY GOOD: Bird data and inventory data collected under similar conditions. I</a:t>
             </a:r>
             <a:r>
               <a:rPr lang="en-CA" sz="1400" dirty="0" smtClean="0"/>
@@ -5832,6 +5779,230 @@
           </a:p>
         </p:txBody>
       </p:sp>
+      <p:cxnSp>
+        <p:nvCxnSpPr>
+          <p:cNvPr id="5" name="Elbow Connector 4"/>
+          <p:cNvCxnSpPr/>
+          <p:nvPr/>
+        </p:nvCxnSpPr>
+        <p:spPr>
+          <a:xfrm rot="16200000" flipH="1">
+            <a:off x="-98790" y="1201590"/>
+            <a:ext cx="581894" cy="103912"/>
+          </a:xfrm>
+          <a:prstGeom prst="bentConnector3">
+            <a:avLst>
+              <a:gd name="adj1" fmla="val 100000"/>
+            </a:avLst>
+          </a:prstGeom>
+          <a:ln>
+            <a:tailEnd type="triangle"/>
+          </a:ln>
+        </p:spPr>
+        <p:style>
+          <a:lnRef idx="1">
+            <a:schemeClr val="accent1"/>
+          </a:lnRef>
+          <a:fillRef idx="0">
+            <a:schemeClr val="accent1"/>
+          </a:fillRef>
+          <a:effectRef idx="0">
+            <a:schemeClr val="accent1"/>
+          </a:effectRef>
+          <a:fontRef idx="minor">
+            <a:schemeClr val="tx1"/>
+          </a:fontRef>
+        </p:style>
+      </p:cxnSp>
+      <p:sp>
+        <p:nvSpPr>
+          <p:cNvPr id="9" name="TextBox 8"/>
+          <p:cNvSpPr txBox="1"/>
+          <p:nvPr/>
+        </p:nvSpPr>
+        <p:spPr>
+          <a:xfrm>
+            <a:off x="264895" y="1228608"/>
+            <a:ext cx="1866204" cy="1815882"/>
+          </a:xfrm>
+          <a:prstGeom prst="rect">
+            <a:avLst/>
+          </a:prstGeom>
+          <a:noFill/>
+          <a:ln>
+            <a:solidFill>
+              <a:schemeClr val="accent1"/>
+            </a:solidFill>
+          </a:ln>
+        </p:spPr>
+        <p:txBody>
+          <a:bodyPr wrap="square" rtlCol="0">
+            <a:spAutoFit/>
+          </a:bodyPr>
+          <a:lstStyle/>
+          <a:p>
+            <a:pPr marL="285750" indent="-285750">
+              <a:buFont typeface="Arial" panose="020B0604020202020204" pitchFamily="34" charset="0"/>
+              <a:buChar char="•"/>
+            </a:pPr>
+            <a:r>
+              <a:rPr lang="en-US" sz="1400" dirty="0" smtClean="0"/>
+              <a:t>Look for &amp; eliminate </a:t>
+            </a:r>
+            <a:r>
+              <a:rPr lang="en-US" sz="1400" dirty="0" smtClean="0"/>
+              <a:t>duplicates</a:t>
+            </a:r>
+          </a:p>
+          <a:p>
+            <a:pPr marL="285750" indent="-285750">
+              <a:buFont typeface="Arial" panose="020B0604020202020204" pitchFamily="34" charset="0"/>
+              <a:buChar char="•"/>
+            </a:pPr>
+            <a:r>
+              <a:rPr lang="en-US" sz="1400" dirty="0" smtClean="0"/>
+              <a:t>Identify </a:t>
+            </a:r>
+            <a:r>
+              <a:rPr lang="en-US" sz="1400" smtClean="0"/>
+              <a:t>missing data</a:t>
+            </a:r>
+            <a:endParaRPr lang="en-US" sz="1400" dirty="0" smtClean="0"/>
+          </a:p>
+          <a:p>
+            <a:pPr marL="285750" indent="-285750">
+              <a:buFont typeface="Arial" panose="020B0604020202020204" pitchFamily="34" charset="0"/>
+              <a:buChar char="•"/>
+            </a:pPr>
+            <a:r>
+              <a:rPr lang="en-US" sz="1400" dirty="0" smtClean="0"/>
+              <a:t>Find and correct for errors</a:t>
+            </a:r>
+          </a:p>
+          <a:p>
+            <a:pPr marL="285750" indent="-285750">
+              <a:buFont typeface="Arial" panose="020B0604020202020204" pitchFamily="34" charset="0"/>
+              <a:buChar char="•"/>
+            </a:pPr>
+            <a:r>
+              <a:rPr lang="en-US" sz="1400" dirty="0" smtClean="0"/>
+              <a:t>Save csv</a:t>
+            </a:r>
+            <a:endParaRPr lang="en-US" sz="1400" dirty="0"/>
+          </a:p>
+        </p:txBody>
+      </p:sp>
+      <p:sp>
+        <p:nvSpPr>
+          <p:cNvPr id="30" name="TextBox 29"/>
+          <p:cNvSpPr txBox="1"/>
+          <p:nvPr/>
+        </p:nvSpPr>
+        <p:spPr>
+          <a:xfrm>
+            <a:off x="295457" y="987330"/>
+            <a:ext cx="537327" cy="276999"/>
+          </a:xfrm>
+          <a:prstGeom prst="rect">
+            <a:avLst/>
+          </a:prstGeom>
+          <a:noFill/>
+        </p:spPr>
+        <p:txBody>
+          <a:bodyPr wrap="none" rtlCol="0">
+            <a:spAutoFit/>
+          </a:bodyPr>
+          <a:lstStyle/>
+          <a:p>
+            <a:r>
+              <a:rPr lang="en-CA" sz="1200" dirty="0" smtClean="0"/>
+              <a:t>00.01</a:t>
+            </a:r>
+            <a:endParaRPr lang="en-US" sz="1200" dirty="0"/>
+          </a:p>
+        </p:txBody>
+      </p:sp>
+    </p:spTree>
+    <p:extLst>
+      <p:ext uri="{BB962C8B-B14F-4D97-AF65-F5344CB8AC3E}">
+        <p14:creationId xmlns:p14="http://schemas.microsoft.com/office/powerpoint/2010/main" val="3228582158"/>
+      </p:ext>
+    </p:extLst>
+  </p:cSld>
+  <p:clrMapOvr>
+    <a:masterClrMapping/>
+  </p:clrMapOvr>
+</p:sld>
+</file>
+
+<file path=ppt/slides/slide5.xml><?xml version="1.0" encoding="utf-8"?>
+<p:sld xmlns:a="http://schemas.openxmlformats.org/drawingml/2006/main" xmlns:r="http://schemas.openxmlformats.org/officeDocument/2006/relationships" xmlns:p="http://schemas.openxmlformats.org/presentationml/2006/main">
+  <p:cSld>
+    <p:spTree>
+      <p:nvGrpSpPr>
+        <p:cNvPr id="1" name=""/>
+        <p:cNvGrpSpPr/>
+        <p:nvPr/>
+      </p:nvGrpSpPr>
+      <p:grpSpPr>
+        <a:xfrm>
+          <a:off x="0" y="0"/>
+          <a:ext cx="0" cy="0"/>
+          <a:chOff x="0" y="0"/>
+          <a:chExt cx="0" cy="0"/>
+        </a:xfrm>
+      </p:grpSpPr>
+      <p:sp>
+        <p:nvSpPr>
+          <p:cNvPr id="2" name="Rectangle 1"/>
+          <p:cNvSpPr/>
+          <p:nvPr/>
+        </p:nvSpPr>
+        <p:spPr>
+          <a:xfrm>
+            <a:off x="61229" y="73137"/>
+            <a:ext cx="2069869" cy="889462"/>
+          </a:xfrm>
+          <a:prstGeom prst="rect">
+            <a:avLst/>
+          </a:prstGeom>
+        </p:spPr>
+        <p:style>
+          <a:lnRef idx="2">
+            <a:schemeClr val="accent1">
+              <a:shade val="50000"/>
+            </a:schemeClr>
+          </a:lnRef>
+          <a:fillRef idx="1">
+            <a:schemeClr val="accent1"/>
+          </a:fillRef>
+          <a:effectRef idx="0">
+            <a:schemeClr val="accent1"/>
+          </a:effectRef>
+          <a:fontRef idx="minor">
+            <a:schemeClr val="lt1"/>
+          </a:fontRef>
+        </p:style>
+        <p:txBody>
+          <a:bodyPr rtlCol="0" anchor="ctr"/>
+          <a:lstStyle/>
+          <a:p>
+            <a:pPr algn="ctr"/>
+            <a:r>
+              <a:rPr lang="en-US" dirty="0" smtClean="0"/>
+              <a:t>Quality-check </a:t>
+            </a:r>
+            <a:br>
+              <a:rPr lang="en-US" dirty="0" smtClean="0"/>
+            </a:br>
+            <a:r>
+              <a:rPr lang="en-US" dirty="0" smtClean="0"/>
+              <a:t>Bird Data</a:t>
+            </a:r>
+            <a:endParaRPr lang="en-US" dirty="0"/>
+          </a:p>
+        </p:txBody>
+      </p:sp>
       <p:sp>
         <p:nvSpPr>
           <p:cNvPr id="3" name="Rectangle 2"/>
@@ -7174,7 +7345,1427 @@
     </p:spTree>
     <p:extLst>
       <p:ext uri="{BB962C8B-B14F-4D97-AF65-F5344CB8AC3E}">
-        <p14:creationId xmlns:p14="http://schemas.microsoft.com/office/powerpoint/2010/main" val="3228582158"/>
+        <p14:creationId xmlns:p14="http://schemas.microsoft.com/office/powerpoint/2010/main" val="1208913501"/>
+      </p:ext>
+    </p:extLst>
+  </p:cSld>
+  <p:clrMapOvr>
+    <a:masterClrMapping/>
+  </p:clrMapOvr>
+</p:sld>
+</file>
+
+<file path=ppt/slides/slide6.xml><?xml version="1.0" encoding="utf-8"?>
+<p:sld xmlns:a="http://schemas.openxmlformats.org/drawingml/2006/main" xmlns:r="http://schemas.openxmlformats.org/officeDocument/2006/relationships" xmlns:p="http://schemas.openxmlformats.org/presentationml/2006/main">
+  <p:cSld>
+    <p:spTree>
+      <p:nvGrpSpPr>
+        <p:cNvPr id="1" name=""/>
+        <p:cNvGrpSpPr/>
+        <p:nvPr/>
+      </p:nvGrpSpPr>
+      <p:grpSpPr>
+        <a:xfrm>
+          <a:off x="0" y="0"/>
+          <a:ext cx="0" cy="0"/>
+          <a:chOff x="0" y="0"/>
+          <a:chExt cx="0" cy="0"/>
+        </a:xfrm>
+      </p:grpSpPr>
+      <p:sp>
+        <p:nvSpPr>
+          <p:cNvPr id="2" name="Rectangle 1"/>
+          <p:cNvSpPr/>
+          <p:nvPr/>
+        </p:nvSpPr>
+        <p:spPr>
+          <a:xfrm>
+            <a:off x="61229" y="73137"/>
+            <a:ext cx="2069869" cy="889462"/>
+          </a:xfrm>
+          <a:prstGeom prst="rect">
+            <a:avLst/>
+          </a:prstGeom>
+        </p:spPr>
+        <p:style>
+          <a:lnRef idx="2">
+            <a:schemeClr val="accent1">
+              <a:shade val="50000"/>
+            </a:schemeClr>
+          </a:lnRef>
+          <a:fillRef idx="1">
+            <a:schemeClr val="accent1"/>
+          </a:fillRef>
+          <a:effectRef idx="0">
+            <a:schemeClr val="accent1"/>
+          </a:effectRef>
+          <a:fontRef idx="minor">
+            <a:schemeClr val="lt1"/>
+          </a:fontRef>
+        </p:style>
+        <p:txBody>
+          <a:bodyPr rtlCol="0" anchor="ctr"/>
+          <a:lstStyle/>
+          <a:p>
+            <a:pPr algn="ctr"/>
+            <a:r>
+              <a:rPr lang="en-US" dirty="0" smtClean="0"/>
+              <a:t>Quality-check </a:t>
+            </a:r>
+            <a:br>
+              <a:rPr lang="en-US" dirty="0" smtClean="0"/>
+            </a:br>
+            <a:r>
+              <a:rPr lang="en-US" dirty="0" smtClean="0"/>
+              <a:t>Bird Data</a:t>
+            </a:r>
+            <a:endParaRPr lang="en-US" dirty="0"/>
+          </a:p>
+        </p:txBody>
+      </p:sp>
+      <p:sp>
+        <p:nvSpPr>
+          <p:cNvPr id="3" name="Rectangle 2"/>
+          <p:cNvSpPr/>
+          <p:nvPr/>
+        </p:nvSpPr>
+        <p:spPr>
+          <a:xfrm>
+            <a:off x="2210070" y="76205"/>
+            <a:ext cx="3423046" cy="889462"/>
+          </a:xfrm>
+          <a:prstGeom prst="rect">
+            <a:avLst/>
+          </a:prstGeom>
+        </p:spPr>
+        <p:style>
+          <a:lnRef idx="2">
+            <a:schemeClr val="accent2">
+              <a:shade val="50000"/>
+            </a:schemeClr>
+          </a:lnRef>
+          <a:fillRef idx="1">
+            <a:schemeClr val="accent2"/>
+          </a:fillRef>
+          <a:effectRef idx="0">
+            <a:schemeClr val="accent2"/>
+          </a:effectRef>
+          <a:fontRef idx="minor">
+            <a:schemeClr val="lt1"/>
+          </a:fontRef>
+        </p:style>
+        <p:txBody>
+          <a:bodyPr rtlCol="0" anchor="ctr"/>
+          <a:lstStyle/>
+          <a:p>
+            <a:pPr algn="ctr"/>
+            <a:r>
+              <a:rPr lang="en-US" dirty="0" smtClean="0"/>
+              <a:t>Pre-Process </a:t>
+            </a:r>
+            <a:br>
+              <a:rPr lang="en-US" dirty="0" smtClean="0"/>
+            </a:br>
+            <a:r>
+              <a:rPr lang="en-US" dirty="0" smtClean="0"/>
+              <a:t>VRI Data</a:t>
+            </a:r>
+            <a:endParaRPr lang="en-US" dirty="0"/>
+          </a:p>
+        </p:txBody>
+      </p:sp>
+      <p:cxnSp>
+        <p:nvCxnSpPr>
+          <p:cNvPr id="5" name="Elbow Connector 4"/>
+          <p:cNvCxnSpPr/>
+          <p:nvPr/>
+        </p:nvCxnSpPr>
+        <p:spPr>
+          <a:xfrm rot="16200000" flipH="1">
+            <a:off x="-98790" y="1201590"/>
+            <a:ext cx="581894" cy="103912"/>
+          </a:xfrm>
+          <a:prstGeom prst="bentConnector3">
+            <a:avLst>
+              <a:gd name="adj1" fmla="val 100000"/>
+            </a:avLst>
+          </a:prstGeom>
+          <a:ln>
+            <a:tailEnd type="triangle"/>
+          </a:ln>
+        </p:spPr>
+        <p:style>
+          <a:lnRef idx="1">
+            <a:schemeClr val="accent1"/>
+          </a:lnRef>
+          <a:fillRef idx="0">
+            <a:schemeClr val="accent1"/>
+          </a:fillRef>
+          <a:effectRef idx="0">
+            <a:schemeClr val="accent1"/>
+          </a:effectRef>
+          <a:fontRef idx="minor">
+            <a:schemeClr val="tx1"/>
+          </a:fontRef>
+        </p:style>
+      </p:cxnSp>
+      <p:sp>
+        <p:nvSpPr>
+          <p:cNvPr id="9" name="TextBox 8"/>
+          <p:cNvSpPr txBox="1"/>
+          <p:nvPr/>
+        </p:nvSpPr>
+        <p:spPr>
+          <a:xfrm>
+            <a:off x="264895" y="1228608"/>
+            <a:ext cx="1866204" cy="1384995"/>
+          </a:xfrm>
+          <a:prstGeom prst="rect">
+            <a:avLst/>
+          </a:prstGeom>
+          <a:noFill/>
+          <a:ln>
+            <a:solidFill>
+              <a:schemeClr val="accent1"/>
+            </a:solidFill>
+          </a:ln>
+        </p:spPr>
+        <p:txBody>
+          <a:bodyPr wrap="square" rtlCol="0">
+            <a:spAutoFit/>
+          </a:bodyPr>
+          <a:lstStyle/>
+          <a:p>
+            <a:pPr marL="285750" indent="-285750">
+              <a:buFont typeface="Arial" panose="020B0604020202020204" pitchFamily="34" charset="0"/>
+              <a:buChar char="•"/>
+            </a:pPr>
+            <a:r>
+              <a:rPr lang="en-US" sz="1400" dirty="0" smtClean="0"/>
+              <a:t>Look for &amp; eliminate duplicates</a:t>
+            </a:r>
+          </a:p>
+          <a:p>
+            <a:pPr marL="285750" indent="-285750">
+              <a:buFont typeface="Arial" panose="020B0604020202020204" pitchFamily="34" charset="0"/>
+              <a:buChar char="•"/>
+            </a:pPr>
+            <a:r>
+              <a:rPr lang="en-US" sz="1400" dirty="0" smtClean="0"/>
+              <a:t>Find and correct for errors</a:t>
+            </a:r>
+          </a:p>
+          <a:p>
+            <a:pPr marL="285750" indent="-285750">
+              <a:buFont typeface="Arial" panose="020B0604020202020204" pitchFamily="34" charset="0"/>
+              <a:buChar char="•"/>
+            </a:pPr>
+            <a:r>
+              <a:rPr lang="en-US" sz="1400" dirty="0" smtClean="0"/>
+              <a:t>Save csv</a:t>
+            </a:r>
+            <a:endParaRPr lang="en-US" sz="1400" dirty="0"/>
+          </a:p>
+        </p:txBody>
+      </p:sp>
+      <p:sp>
+        <p:nvSpPr>
+          <p:cNvPr id="11" name="TextBox 10"/>
+          <p:cNvSpPr txBox="1"/>
+          <p:nvPr/>
+        </p:nvSpPr>
+        <p:spPr>
+          <a:xfrm>
+            <a:off x="4308066" y="1339364"/>
+            <a:ext cx="1325050" cy="954107"/>
+          </a:xfrm>
+          <a:prstGeom prst="rect">
+            <a:avLst/>
+          </a:prstGeom>
+          <a:noFill/>
+          <a:ln>
+            <a:solidFill>
+              <a:schemeClr val="accent2"/>
+            </a:solidFill>
+          </a:ln>
+        </p:spPr>
+        <p:txBody>
+          <a:bodyPr wrap="square" rtlCol="0">
+            <a:spAutoFit/>
+          </a:bodyPr>
+          <a:lstStyle/>
+          <a:p>
+            <a:pPr marL="285750" indent="-285750">
+              <a:buFont typeface="Arial" panose="020B0604020202020204" pitchFamily="34" charset="0"/>
+              <a:buChar char="•"/>
+            </a:pPr>
+            <a:r>
+              <a:rPr lang="en-US" sz="1400" dirty="0"/>
+              <a:t>Look for &amp; eliminate duplicates</a:t>
+            </a:r>
+          </a:p>
+          <a:p>
+            <a:pPr marL="285750" indent="-285750">
+              <a:buFont typeface="Arial" panose="020B0604020202020204" pitchFamily="34" charset="0"/>
+              <a:buChar char="•"/>
+            </a:pPr>
+            <a:r>
+              <a:rPr lang="en-US" sz="1400" dirty="0" smtClean="0"/>
+              <a:t>Save </a:t>
+            </a:r>
+            <a:r>
+              <a:rPr lang="en-US" sz="1400" dirty="0" err="1" smtClean="0"/>
+              <a:t>RData</a:t>
+            </a:r>
+            <a:endParaRPr lang="en-US" sz="1400" dirty="0"/>
+          </a:p>
+        </p:txBody>
+      </p:sp>
+      <p:cxnSp>
+        <p:nvCxnSpPr>
+          <p:cNvPr id="8" name="Elbow Connector 7"/>
+          <p:cNvCxnSpPr/>
+          <p:nvPr/>
+        </p:nvCxnSpPr>
+        <p:spPr>
+          <a:xfrm rot="16200000" flipH="1">
+            <a:off x="1475311" y="2029859"/>
+            <a:ext cx="1684256" cy="139938"/>
+          </a:xfrm>
+          <a:prstGeom prst="bentConnector3">
+            <a:avLst>
+              <a:gd name="adj1" fmla="val 99849"/>
+            </a:avLst>
+          </a:prstGeom>
+          <a:ln>
+            <a:solidFill>
+              <a:schemeClr val="accent2"/>
+            </a:solidFill>
+            <a:tailEnd type="triangle"/>
+          </a:ln>
+        </p:spPr>
+        <p:style>
+          <a:lnRef idx="1">
+            <a:schemeClr val="accent1"/>
+          </a:lnRef>
+          <a:fillRef idx="0">
+            <a:schemeClr val="accent1"/>
+          </a:fillRef>
+          <a:effectRef idx="0">
+            <a:schemeClr val="accent1"/>
+          </a:effectRef>
+          <a:fontRef idx="minor">
+            <a:schemeClr val="tx1"/>
+          </a:fontRef>
+        </p:style>
+      </p:cxnSp>
+      <p:cxnSp>
+        <p:nvCxnSpPr>
+          <p:cNvPr id="13" name="Elbow Connector 12"/>
+          <p:cNvCxnSpPr/>
+          <p:nvPr/>
+        </p:nvCxnSpPr>
+        <p:spPr>
+          <a:xfrm rot="16200000" flipH="1">
+            <a:off x="2267307" y="3712311"/>
+            <a:ext cx="658632" cy="149640"/>
+          </a:xfrm>
+          <a:prstGeom prst="bentConnector3">
+            <a:avLst>
+              <a:gd name="adj1" fmla="val 99223"/>
+            </a:avLst>
+          </a:prstGeom>
+          <a:ln>
+            <a:solidFill>
+              <a:schemeClr val="accent2"/>
+            </a:solidFill>
+            <a:tailEnd type="triangle"/>
+          </a:ln>
+        </p:spPr>
+        <p:style>
+          <a:lnRef idx="1">
+            <a:schemeClr val="accent1"/>
+          </a:lnRef>
+          <a:fillRef idx="0">
+            <a:schemeClr val="accent1"/>
+          </a:fillRef>
+          <a:effectRef idx="0">
+            <a:schemeClr val="accent1"/>
+          </a:effectRef>
+          <a:fontRef idx="minor">
+            <a:schemeClr val="tx1"/>
+          </a:fontRef>
+        </p:style>
+      </p:cxnSp>
+      <p:sp>
+        <p:nvSpPr>
+          <p:cNvPr id="14" name="TextBox 13"/>
+          <p:cNvSpPr txBox="1"/>
+          <p:nvPr/>
+        </p:nvSpPr>
+        <p:spPr>
+          <a:xfrm>
+            <a:off x="2433130" y="2719151"/>
+            <a:ext cx="1578443" cy="738664"/>
+          </a:xfrm>
+          <a:prstGeom prst="rect">
+            <a:avLst/>
+          </a:prstGeom>
+          <a:noFill/>
+          <a:ln>
+            <a:solidFill>
+              <a:schemeClr val="accent2"/>
+            </a:solidFill>
+          </a:ln>
+        </p:spPr>
+        <p:txBody>
+          <a:bodyPr wrap="square" rtlCol="0">
+            <a:spAutoFit/>
+          </a:bodyPr>
+          <a:lstStyle/>
+          <a:p>
+            <a:pPr marL="285750" indent="-285750">
+              <a:buFont typeface="Arial" panose="020B0604020202020204" pitchFamily="34" charset="0"/>
+              <a:buChar char="•"/>
+            </a:pPr>
+            <a:r>
+              <a:rPr lang="en-CA" sz="1400" dirty="0" smtClean="0"/>
+              <a:t>Standardize tree species codes</a:t>
+            </a:r>
+          </a:p>
+        </p:txBody>
+      </p:sp>
+      <p:sp>
+        <p:nvSpPr>
+          <p:cNvPr id="17" name="Rectangle 16"/>
+          <p:cNvSpPr/>
+          <p:nvPr/>
+        </p:nvSpPr>
+        <p:spPr>
+          <a:xfrm>
+            <a:off x="5798187" y="97868"/>
+            <a:ext cx="1886989" cy="889462"/>
+          </a:xfrm>
+          <a:prstGeom prst="rect">
+            <a:avLst/>
+          </a:prstGeom>
+        </p:spPr>
+        <p:style>
+          <a:lnRef idx="2">
+            <a:schemeClr val="accent6">
+              <a:shade val="50000"/>
+            </a:schemeClr>
+          </a:lnRef>
+          <a:fillRef idx="1">
+            <a:schemeClr val="accent6"/>
+          </a:fillRef>
+          <a:effectRef idx="0">
+            <a:schemeClr val="accent6"/>
+          </a:effectRef>
+          <a:fontRef idx="minor">
+            <a:schemeClr val="lt1"/>
+          </a:fontRef>
+        </p:style>
+        <p:txBody>
+          <a:bodyPr rtlCol="0" anchor="ctr"/>
+          <a:lstStyle/>
+          <a:p>
+            <a:pPr algn="ctr"/>
+            <a:r>
+              <a:rPr lang="en-US" dirty="0" smtClean="0"/>
+              <a:t>Pre-process intersected VRI Data</a:t>
+            </a:r>
+            <a:endParaRPr lang="en-US" dirty="0"/>
+          </a:p>
+        </p:txBody>
+      </p:sp>
+      <p:cxnSp>
+        <p:nvCxnSpPr>
+          <p:cNvPr id="18" name="Elbow Connector 17"/>
+          <p:cNvCxnSpPr/>
+          <p:nvPr/>
+        </p:nvCxnSpPr>
+        <p:spPr>
+          <a:xfrm rot="16200000" flipH="1">
+            <a:off x="5762858" y="1226322"/>
+            <a:ext cx="581894" cy="103912"/>
+          </a:xfrm>
+          <a:prstGeom prst="bentConnector3">
+            <a:avLst>
+              <a:gd name="adj1" fmla="val 100000"/>
+            </a:avLst>
+          </a:prstGeom>
+          <a:ln>
+            <a:solidFill>
+              <a:srgbClr val="935C2F"/>
+            </a:solidFill>
+            <a:tailEnd type="triangle"/>
+          </a:ln>
+        </p:spPr>
+        <p:style>
+          <a:lnRef idx="1">
+            <a:schemeClr val="accent1"/>
+          </a:lnRef>
+          <a:fillRef idx="0">
+            <a:schemeClr val="accent1"/>
+          </a:fillRef>
+          <a:effectRef idx="0">
+            <a:schemeClr val="accent1"/>
+          </a:effectRef>
+          <a:fontRef idx="minor">
+            <a:schemeClr val="tx1"/>
+          </a:fontRef>
+        </p:style>
+      </p:cxnSp>
+      <p:sp>
+        <p:nvSpPr>
+          <p:cNvPr id="19" name="TextBox 18"/>
+          <p:cNvSpPr txBox="1"/>
+          <p:nvPr/>
+        </p:nvSpPr>
+        <p:spPr>
+          <a:xfrm>
+            <a:off x="6105761" y="1730561"/>
+            <a:ext cx="2062939" cy="2893100"/>
+          </a:xfrm>
+          <a:prstGeom prst="rect">
+            <a:avLst/>
+          </a:prstGeom>
+          <a:noFill/>
+          <a:ln>
+            <a:solidFill>
+              <a:srgbClr val="935C2F"/>
+            </a:solidFill>
+          </a:ln>
+        </p:spPr>
+        <p:txBody>
+          <a:bodyPr wrap="square" rtlCol="0">
+            <a:spAutoFit/>
+          </a:bodyPr>
+          <a:lstStyle/>
+          <a:p>
+            <a:pPr marL="285750" indent="-285750">
+              <a:buFont typeface="Arial" panose="020B0604020202020204" pitchFamily="34" charset="0"/>
+              <a:buChar char="•"/>
+            </a:pPr>
+            <a:r>
+              <a:rPr lang="en-CA" sz="1400" dirty="0" smtClean="0"/>
+              <a:t>Check for duplicates within each intersected dataset</a:t>
+            </a:r>
+          </a:p>
+          <a:p>
+            <a:pPr marL="285750" indent="-285750">
+              <a:buFont typeface="Arial" panose="020B0604020202020204" pitchFamily="34" charset="0"/>
+              <a:buChar char="•"/>
+            </a:pPr>
+            <a:r>
+              <a:rPr lang="en-CA" sz="1400" dirty="0" smtClean="0"/>
+              <a:t>Identify how to extract corrected attributes from full </a:t>
+            </a:r>
+            <a:r>
+              <a:rPr lang="en-CA" sz="1400" dirty="0" err="1" smtClean="0"/>
+              <a:t>vri</a:t>
+            </a:r>
+            <a:r>
+              <a:rPr lang="en-CA" sz="1400" dirty="0" smtClean="0"/>
+              <a:t> table based on a polygon identifier</a:t>
+            </a:r>
+          </a:p>
+          <a:p>
+            <a:pPr marL="285750" indent="-285750">
+              <a:buFont typeface="Arial" panose="020B0604020202020204" pitchFamily="34" charset="0"/>
+              <a:buChar char="•"/>
+            </a:pPr>
+            <a:r>
+              <a:rPr lang="en-CA" sz="1400" dirty="0" smtClean="0"/>
+              <a:t>Check for duplicates among datasets</a:t>
+            </a:r>
+          </a:p>
+          <a:p>
+            <a:pPr marL="285750" indent="-285750">
+              <a:buFont typeface="Arial" panose="020B0604020202020204" pitchFamily="34" charset="0"/>
+              <a:buChar char="•"/>
+            </a:pPr>
+            <a:r>
+              <a:rPr lang="en-CA" sz="1400" dirty="0" smtClean="0"/>
+              <a:t>Extract attributes from full VRI file for each bird point</a:t>
+            </a:r>
+          </a:p>
+        </p:txBody>
+      </p:sp>
+      <p:cxnSp>
+        <p:nvCxnSpPr>
+          <p:cNvPr id="22" name="Elbow Connector 21"/>
+          <p:cNvCxnSpPr/>
+          <p:nvPr/>
+        </p:nvCxnSpPr>
+        <p:spPr>
+          <a:xfrm rot="16200000" flipH="1">
+            <a:off x="5967827" y="4811743"/>
+            <a:ext cx="457200" cy="91440"/>
+          </a:xfrm>
+          <a:prstGeom prst="bentConnector3">
+            <a:avLst>
+              <a:gd name="adj1" fmla="val 103437"/>
+            </a:avLst>
+          </a:prstGeom>
+          <a:ln>
+            <a:solidFill>
+              <a:srgbClr val="935C2F"/>
+            </a:solidFill>
+            <a:tailEnd type="triangle"/>
+          </a:ln>
+        </p:spPr>
+        <p:style>
+          <a:lnRef idx="1">
+            <a:schemeClr val="accent1"/>
+          </a:lnRef>
+          <a:fillRef idx="0">
+            <a:schemeClr val="accent1"/>
+          </a:fillRef>
+          <a:effectRef idx="0">
+            <a:schemeClr val="accent1"/>
+          </a:effectRef>
+          <a:fontRef idx="minor">
+            <a:schemeClr val="tx1"/>
+          </a:fontRef>
+        </p:style>
+      </p:cxnSp>
+      <p:sp>
+        <p:nvSpPr>
+          <p:cNvPr id="23" name="TextBox 22"/>
+          <p:cNvSpPr txBox="1"/>
+          <p:nvPr/>
+        </p:nvSpPr>
+        <p:spPr>
+          <a:xfrm>
+            <a:off x="6105761" y="1422784"/>
+            <a:ext cx="2062939" cy="307777"/>
+          </a:xfrm>
+          <a:prstGeom prst="rect">
+            <a:avLst/>
+          </a:prstGeom>
+          <a:solidFill>
+            <a:schemeClr val="accent6">
+              <a:lumMod val="40000"/>
+              <a:lumOff val="60000"/>
+            </a:schemeClr>
+          </a:solidFill>
+          <a:ln>
+            <a:solidFill>
+              <a:srgbClr val="935C2F"/>
+            </a:solidFill>
+          </a:ln>
+        </p:spPr>
+        <p:txBody>
+          <a:bodyPr wrap="square" rtlCol="0">
+            <a:spAutoFit/>
+          </a:bodyPr>
+          <a:lstStyle/>
+          <a:p>
+            <a:r>
+              <a:rPr lang="en-US" sz="1400" dirty="0" smtClean="0"/>
+              <a:t>Extract intersected VRI</a:t>
+            </a:r>
+            <a:endParaRPr lang="en-US" sz="1400" dirty="0"/>
+          </a:p>
+        </p:txBody>
+      </p:sp>
+      <p:sp>
+        <p:nvSpPr>
+          <p:cNvPr id="7" name="TextBox 6"/>
+          <p:cNvSpPr txBox="1"/>
+          <p:nvPr/>
+        </p:nvSpPr>
+        <p:spPr>
+          <a:xfrm>
+            <a:off x="2445115" y="1114043"/>
+            <a:ext cx="1351652" cy="276999"/>
+          </a:xfrm>
+          <a:prstGeom prst="rect">
+            <a:avLst/>
+          </a:prstGeom>
+          <a:noFill/>
+        </p:spPr>
+        <p:txBody>
+          <a:bodyPr wrap="none" rtlCol="0">
+            <a:spAutoFit/>
+          </a:bodyPr>
+          <a:lstStyle/>
+          <a:p>
+            <a:r>
+              <a:rPr lang="en-CA" sz="1200" dirty="0" smtClean="0"/>
+              <a:t>01.01 – </a:t>
+            </a:r>
+            <a:r>
+              <a:rPr lang="en-CA" sz="1200" dirty="0" err="1" smtClean="0"/>
+              <a:t>Forsite</a:t>
+            </a:r>
+            <a:r>
+              <a:rPr lang="en-CA" sz="1200" dirty="0" smtClean="0"/>
+              <a:t> VRI</a:t>
+            </a:r>
+            <a:endParaRPr lang="en-US" sz="1200" dirty="0"/>
+          </a:p>
+        </p:txBody>
+      </p:sp>
+      <p:sp>
+        <p:nvSpPr>
+          <p:cNvPr id="30" name="TextBox 29"/>
+          <p:cNvSpPr txBox="1"/>
+          <p:nvPr/>
+        </p:nvSpPr>
+        <p:spPr>
+          <a:xfrm>
+            <a:off x="295457" y="987330"/>
+            <a:ext cx="537327" cy="276999"/>
+          </a:xfrm>
+          <a:prstGeom prst="rect">
+            <a:avLst/>
+          </a:prstGeom>
+          <a:noFill/>
+        </p:spPr>
+        <p:txBody>
+          <a:bodyPr wrap="none" rtlCol="0">
+            <a:spAutoFit/>
+          </a:bodyPr>
+          <a:lstStyle/>
+          <a:p>
+            <a:r>
+              <a:rPr lang="en-CA" sz="1200" dirty="0" smtClean="0"/>
+              <a:t>00.01</a:t>
+            </a:r>
+            <a:endParaRPr lang="en-US" sz="1200" dirty="0"/>
+          </a:p>
+        </p:txBody>
+      </p:sp>
+      <p:cxnSp>
+        <p:nvCxnSpPr>
+          <p:cNvPr id="44" name="Elbow Connector 43"/>
+          <p:cNvCxnSpPr>
+            <a:endCxn id="11" idx="1"/>
+          </p:cNvCxnSpPr>
+          <p:nvPr/>
+        </p:nvCxnSpPr>
+        <p:spPr>
+          <a:xfrm rot="16200000" flipH="1">
+            <a:off x="3782931" y="1291283"/>
+            <a:ext cx="865998" cy="184272"/>
+          </a:xfrm>
+          <a:prstGeom prst="bentConnector2">
+            <a:avLst/>
+          </a:prstGeom>
+          <a:ln>
+            <a:solidFill>
+              <a:schemeClr val="accent2"/>
+            </a:solidFill>
+            <a:tailEnd type="triangle"/>
+          </a:ln>
+        </p:spPr>
+        <p:style>
+          <a:lnRef idx="1">
+            <a:schemeClr val="accent1"/>
+          </a:lnRef>
+          <a:fillRef idx="0">
+            <a:schemeClr val="accent1"/>
+          </a:fillRef>
+          <a:effectRef idx="0">
+            <a:schemeClr val="accent1"/>
+          </a:effectRef>
+          <a:fontRef idx="minor">
+            <a:schemeClr val="tx1"/>
+          </a:fontRef>
+        </p:style>
+      </p:cxnSp>
+      <p:sp>
+        <p:nvSpPr>
+          <p:cNvPr id="47" name="TextBox 46"/>
+          <p:cNvSpPr txBox="1"/>
+          <p:nvPr/>
+        </p:nvSpPr>
+        <p:spPr>
+          <a:xfrm>
+            <a:off x="2433130" y="1339364"/>
+            <a:ext cx="1578443" cy="954107"/>
+          </a:xfrm>
+          <a:prstGeom prst="rect">
+            <a:avLst/>
+          </a:prstGeom>
+          <a:noFill/>
+          <a:ln>
+            <a:solidFill>
+              <a:schemeClr val="accent2"/>
+            </a:solidFill>
+          </a:ln>
+        </p:spPr>
+        <p:txBody>
+          <a:bodyPr wrap="square" rtlCol="0">
+            <a:spAutoFit/>
+          </a:bodyPr>
+          <a:lstStyle/>
+          <a:p>
+            <a:pPr marL="285750" indent="-285750">
+              <a:buFont typeface="Arial" panose="020B0604020202020204" pitchFamily="34" charset="0"/>
+              <a:buChar char="•"/>
+            </a:pPr>
+            <a:r>
+              <a:rPr lang="en-US" sz="1400" dirty="0"/>
+              <a:t>Look for &amp; eliminate duplicates</a:t>
+            </a:r>
+          </a:p>
+          <a:p>
+            <a:pPr marL="285750" indent="-285750">
+              <a:buFont typeface="Arial" panose="020B0604020202020204" pitchFamily="34" charset="0"/>
+              <a:buChar char="•"/>
+            </a:pPr>
+            <a:r>
+              <a:rPr lang="en-US" sz="1400" dirty="0" smtClean="0"/>
+              <a:t>Save </a:t>
+            </a:r>
+            <a:r>
+              <a:rPr lang="en-US" sz="1400" dirty="0" err="1" smtClean="0"/>
+              <a:t>RData</a:t>
+            </a:r>
+            <a:endParaRPr lang="en-US" sz="1400" dirty="0"/>
+          </a:p>
+        </p:txBody>
+      </p:sp>
+      <p:cxnSp>
+        <p:nvCxnSpPr>
+          <p:cNvPr id="48" name="Elbow Connector 47"/>
+          <p:cNvCxnSpPr>
+            <a:endCxn id="47" idx="1"/>
+          </p:cNvCxnSpPr>
+          <p:nvPr/>
+        </p:nvCxnSpPr>
+        <p:spPr>
+          <a:xfrm rot="16200000" flipH="1">
+            <a:off x="1907995" y="1291283"/>
+            <a:ext cx="865998" cy="184272"/>
+          </a:xfrm>
+          <a:prstGeom prst="bentConnector2">
+            <a:avLst/>
+          </a:prstGeom>
+          <a:ln>
+            <a:solidFill>
+              <a:schemeClr val="accent2"/>
+            </a:solidFill>
+            <a:tailEnd type="triangle"/>
+          </a:ln>
+        </p:spPr>
+        <p:style>
+          <a:lnRef idx="1">
+            <a:schemeClr val="accent1"/>
+          </a:lnRef>
+          <a:fillRef idx="0">
+            <a:schemeClr val="accent1"/>
+          </a:fillRef>
+          <a:effectRef idx="0">
+            <a:schemeClr val="accent1"/>
+          </a:effectRef>
+          <a:fontRef idx="minor">
+            <a:schemeClr val="tx1"/>
+          </a:fontRef>
+        </p:style>
+      </p:cxnSp>
+      <p:sp>
+        <p:nvSpPr>
+          <p:cNvPr id="51" name="TextBox 50"/>
+          <p:cNvSpPr txBox="1"/>
+          <p:nvPr/>
+        </p:nvSpPr>
+        <p:spPr>
+          <a:xfrm>
+            <a:off x="4252904" y="1103426"/>
+            <a:ext cx="1342740" cy="276999"/>
+          </a:xfrm>
+          <a:prstGeom prst="rect">
+            <a:avLst/>
+          </a:prstGeom>
+          <a:noFill/>
+        </p:spPr>
+        <p:txBody>
+          <a:bodyPr wrap="none" rtlCol="0">
+            <a:spAutoFit/>
+          </a:bodyPr>
+          <a:lstStyle/>
+          <a:p>
+            <a:r>
+              <a:rPr lang="en-CA" sz="1200" dirty="0" smtClean="0"/>
+              <a:t>01.02 – Canfor TFL</a:t>
+            </a:r>
+            <a:endParaRPr lang="en-US" sz="1200" dirty="0"/>
+          </a:p>
+        </p:txBody>
+      </p:sp>
+      <p:sp>
+        <p:nvSpPr>
+          <p:cNvPr id="52" name="TextBox 51"/>
+          <p:cNvSpPr txBox="1"/>
+          <p:nvPr/>
+        </p:nvSpPr>
+        <p:spPr>
+          <a:xfrm>
+            <a:off x="2704895" y="3842946"/>
+            <a:ext cx="1581011" cy="738664"/>
+          </a:xfrm>
+          <a:prstGeom prst="rect">
+            <a:avLst/>
+          </a:prstGeom>
+          <a:noFill/>
+          <a:ln>
+            <a:solidFill>
+              <a:schemeClr val="accent2"/>
+            </a:solidFill>
+          </a:ln>
+        </p:spPr>
+        <p:txBody>
+          <a:bodyPr wrap="square" rtlCol="0">
+            <a:spAutoFit/>
+          </a:bodyPr>
+          <a:lstStyle/>
+          <a:p>
+            <a:pPr marL="285750" indent="-285750">
+              <a:buFont typeface="Arial" panose="020B0604020202020204" pitchFamily="34" charset="0"/>
+              <a:buChar char="•"/>
+            </a:pPr>
+            <a:r>
+              <a:rPr lang="en-CA" sz="1400" dirty="0" smtClean="0"/>
+              <a:t>Quality-check and correct stand areas</a:t>
+            </a:r>
+          </a:p>
+        </p:txBody>
+      </p:sp>
+      <p:sp>
+        <p:nvSpPr>
+          <p:cNvPr id="53" name="TextBox 52"/>
+          <p:cNvSpPr txBox="1"/>
+          <p:nvPr/>
+        </p:nvSpPr>
+        <p:spPr>
+          <a:xfrm>
+            <a:off x="2704895" y="4783235"/>
+            <a:ext cx="1581011" cy="738664"/>
+          </a:xfrm>
+          <a:prstGeom prst="rect">
+            <a:avLst/>
+          </a:prstGeom>
+          <a:noFill/>
+          <a:ln>
+            <a:solidFill>
+              <a:schemeClr val="accent2"/>
+            </a:solidFill>
+          </a:ln>
+        </p:spPr>
+        <p:txBody>
+          <a:bodyPr wrap="square" rtlCol="0">
+            <a:spAutoFit/>
+          </a:bodyPr>
+          <a:lstStyle/>
+          <a:p>
+            <a:pPr marL="285750" indent="-285750">
+              <a:buFont typeface="Arial" panose="020B0604020202020204" pitchFamily="34" charset="0"/>
+              <a:buChar char="•"/>
+            </a:pPr>
+            <a:r>
+              <a:rPr lang="en-CA" sz="1400" dirty="0" smtClean="0"/>
+              <a:t>Quality-check </a:t>
+            </a:r>
+            <a:r>
+              <a:rPr lang="en-CA" sz="1400" dirty="0"/>
+              <a:t>and correct stand </a:t>
+            </a:r>
+            <a:r>
+              <a:rPr lang="en-CA" sz="1400" dirty="0" smtClean="0"/>
+              <a:t>ranks</a:t>
+            </a:r>
+            <a:endParaRPr lang="en-CA" sz="1400" dirty="0"/>
+          </a:p>
+        </p:txBody>
+      </p:sp>
+      <p:cxnSp>
+        <p:nvCxnSpPr>
+          <p:cNvPr id="54" name="Elbow Connector 53"/>
+          <p:cNvCxnSpPr/>
+          <p:nvPr/>
+        </p:nvCxnSpPr>
+        <p:spPr>
+          <a:xfrm rot="16200000" flipH="1">
+            <a:off x="1749644" y="4240470"/>
+            <a:ext cx="1684256" cy="139938"/>
+          </a:xfrm>
+          <a:prstGeom prst="bentConnector3">
+            <a:avLst>
+              <a:gd name="adj1" fmla="val 99849"/>
+            </a:avLst>
+          </a:prstGeom>
+          <a:ln>
+            <a:solidFill>
+              <a:schemeClr val="accent2"/>
+            </a:solidFill>
+            <a:tailEnd type="triangle"/>
+          </a:ln>
+        </p:spPr>
+        <p:style>
+          <a:lnRef idx="1">
+            <a:schemeClr val="accent1"/>
+          </a:lnRef>
+          <a:fillRef idx="0">
+            <a:schemeClr val="accent1"/>
+          </a:fillRef>
+          <a:effectRef idx="0">
+            <a:schemeClr val="accent1"/>
+          </a:effectRef>
+          <a:fontRef idx="minor">
+            <a:schemeClr val="tx1"/>
+          </a:fontRef>
+        </p:style>
+      </p:cxnSp>
+      <p:sp>
+        <p:nvSpPr>
+          <p:cNvPr id="55" name="TextBox 54"/>
+          <p:cNvSpPr txBox="1"/>
+          <p:nvPr/>
+        </p:nvSpPr>
+        <p:spPr>
+          <a:xfrm>
+            <a:off x="2430562" y="2498617"/>
+            <a:ext cx="1560299" cy="461665"/>
+          </a:xfrm>
+          <a:prstGeom prst="rect">
+            <a:avLst/>
+          </a:prstGeom>
+          <a:noFill/>
+        </p:spPr>
+        <p:txBody>
+          <a:bodyPr wrap="none" rtlCol="0">
+            <a:spAutoFit/>
+          </a:bodyPr>
+          <a:lstStyle/>
+          <a:p>
+            <a:r>
+              <a:rPr lang="en-CA" sz="1200" dirty="0" smtClean="0"/>
+              <a:t>01.01a - tree </a:t>
+            </a:r>
+            <a:r>
+              <a:rPr lang="en-CA" sz="1200" dirty="0" err="1" smtClean="0"/>
+              <a:t>sp</a:t>
+            </a:r>
+            <a:r>
+              <a:rPr lang="en-CA" sz="1200" dirty="0" smtClean="0"/>
+              <a:t> group</a:t>
+            </a:r>
+          </a:p>
+          <a:p>
+            <a:endParaRPr lang="en-US" sz="1200" dirty="0"/>
+          </a:p>
+        </p:txBody>
+      </p:sp>
+      <p:sp>
+        <p:nvSpPr>
+          <p:cNvPr id="56" name="TextBox 55"/>
+          <p:cNvSpPr txBox="1"/>
+          <p:nvPr/>
+        </p:nvSpPr>
+        <p:spPr>
+          <a:xfrm>
+            <a:off x="2704895" y="3624363"/>
+            <a:ext cx="1418145" cy="276999"/>
+          </a:xfrm>
+          <a:prstGeom prst="rect">
+            <a:avLst/>
+          </a:prstGeom>
+          <a:noFill/>
+        </p:spPr>
+        <p:txBody>
+          <a:bodyPr wrap="none" rtlCol="0">
+            <a:spAutoFit/>
+          </a:bodyPr>
+          <a:lstStyle/>
+          <a:p>
+            <a:r>
+              <a:rPr lang="en-CA" sz="1200" dirty="0" smtClean="0"/>
+              <a:t>01.01b – stand area</a:t>
+            </a:r>
+            <a:endParaRPr lang="en-US" sz="1200" dirty="0"/>
+          </a:p>
+        </p:txBody>
+      </p:sp>
+      <p:sp>
+        <p:nvSpPr>
+          <p:cNvPr id="57" name="TextBox 56"/>
+          <p:cNvSpPr txBox="1"/>
+          <p:nvPr/>
+        </p:nvSpPr>
+        <p:spPr>
+          <a:xfrm>
+            <a:off x="2704895" y="4566602"/>
+            <a:ext cx="1402628" cy="276999"/>
+          </a:xfrm>
+          <a:prstGeom prst="rect">
+            <a:avLst/>
+          </a:prstGeom>
+          <a:noFill/>
+        </p:spPr>
+        <p:txBody>
+          <a:bodyPr wrap="none" rtlCol="0">
+            <a:spAutoFit/>
+          </a:bodyPr>
+          <a:lstStyle/>
+          <a:p>
+            <a:r>
+              <a:rPr lang="en-CA" sz="1200" dirty="0" smtClean="0"/>
+              <a:t>01.01c – stand rank</a:t>
+            </a:r>
+            <a:endParaRPr lang="en-US" sz="1200" dirty="0"/>
+          </a:p>
+        </p:txBody>
+      </p:sp>
+      <p:cxnSp>
+        <p:nvCxnSpPr>
+          <p:cNvPr id="62" name="Elbow Connector 61"/>
+          <p:cNvCxnSpPr/>
+          <p:nvPr/>
+        </p:nvCxnSpPr>
+        <p:spPr>
+          <a:xfrm rot="16200000" flipH="1">
+            <a:off x="2893035" y="5788156"/>
+            <a:ext cx="658632" cy="149640"/>
+          </a:xfrm>
+          <a:prstGeom prst="bentConnector3">
+            <a:avLst>
+              <a:gd name="adj1" fmla="val 99223"/>
+            </a:avLst>
+          </a:prstGeom>
+          <a:ln>
+            <a:solidFill>
+              <a:schemeClr val="accent2"/>
+            </a:solidFill>
+            <a:tailEnd type="triangle"/>
+          </a:ln>
+        </p:spPr>
+        <p:style>
+          <a:lnRef idx="1">
+            <a:schemeClr val="accent1"/>
+          </a:lnRef>
+          <a:fillRef idx="0">
+            <a:schemeClr val="accent1"/>
+          </a:fillRef>
+          <a:effectRef idx="0">
+            <a:schemeClr val="accent1"/>
+          </a:effectRef>
+          <a:fontRef idx="minor">
+            <a:schemeClr val="tx1"/>
+          </a:fontRef>
+        </p:style>
+      </p:cxnSp>
+      <p:cxnSp>
+        <p:nvCxnSpPr>
+          <p:cNvPr id="63" name="Elbow Connector 62"/>
+          <p:cNvCxnSpPr/>
+          <p:nvPr/>
+        </p:nvCxnSpPr>
+        <p:spPr>
+          <a:xfrm rot="5400000">
+            <a:off x="3437448" y="4094365"/>
+            <a:ext cx="3957791" cy="358602"/>
+          </a:xfrm>
+          <a:prstGeom prst="bentConnector3">
+            <a:avLst>
+              <a:gd name="adj1" fmla="val 99988"/>
+            </a:avLst>
+          </a:prstGeom>
+          <a:ln>
+            <a:solidFill>
+              <a:schemeClr val="accent2"/>
+            </a:solidFill>
+            <a:tailEnd type="triangle"/>
+          </a:ln>
+        </p:spPr>
+        <p:style>
+          <a:lnRef idx="1">
+            <a:schemeClr val="accent1"/>
+          </a:lnRef>
+          <a:fillRef idx="0">
+            <a:schemeClr val="accent1"/>
+          </a:fillRef>
+          <a:effectRef idx="0">
+            <a:schemeClr val="accent1"/>
+          </a:effectRef>
+          <a:fontRef idx="minor">
+            <a:schemeClr val="tx1"/>
+          </a:fontRef>
+        </p:style>
+      </p:cxnSp>
+      <p:sp>
+        <p:nvSpPr>
+          <p:cNvPr id="68" name="TextBox 67"/>
+          <p:cNvSpPr txBox="1"/>
+          <p:nvPr/>
+        </p:nvSpPr>
+        <p:spPr>
+          <a:xfrm>
+            <a:off x="3317017" y="5719914"/>
+            <a:ext cx="1882554" cy="954107"/>
+          </a:xfrm>
+          <a:prstGeom prst="rect">
+            <a:avLst/>
+          </a:prstGeom>
+          <a:noFill/>
+          <a:ln>
+            <a:solidFill>
+              <a:schemeClr val="accent2"/>
+            </a:solidFill>
+          </a:ln>
+        </p:spPr>
+        <p:txBody>
+          <a:bodyPr wrap="square" rtlCol="0">
+            <a:spAutoFit/>
+          </a:bodyPr>
+          <a:lstStyle/>
+          <a:p>
+            <a:pPr marL="285750" indent="-285750">
+              <a:buFont typeface="Arial" panose="020B0604020202020204" pitchFamily="34" charset="0"/>
+              <a:buChar char="•"/>
+            </a:pPr>
+            <a:r>
+              <a:rPr lang="en-CA" sz="1400" dirty="0" smtClean="0"/>
+              <a:t>Format dates</a:t>
+            </a:r>
+          </a:p>
+          <a:p>
+            <a:pPr marL="285750" indent="-285750">
+              <a:buFont typeface="Arial" panose="020B0604020202020204" pitchFamily="34" charset="0"/>
+              <a:buChar char="•"/>
+            </a:pPr>
+            <a:r>
+              <a:rPr lang="en-CA" sz="1400" dirty="0" smtClean="0"/>
+              <a:t>Extract years</a:t>
+            </a:r>
+          </a:p>
+          <a:p>
+            <a:pPr marL="285750" indent="-285750">
+              <a:buFont typeface="Arial" panose="020B0604020202020204" pitchFamily="34" charset="0"/>
+              <a:buChar char="•"/>
+            </a:pPr>
+            <a:r>
+              <a:rPr lang="en-CA" sz="1400" dirty="0" smtClean="0"/>
+              <a:t>Class age</a:t>
+            </a:r>
+          </a:p>
+          <a:p>
+            <a:pPr marL="285750" indent="-285750">
+              <a:buFont typeface="Arial" panose="020B0604020202020204" pitchFamily="34" charset="0"/>
+              <a:buChar char="•"/>
+            </a:pPr>
+            <a:r>
+              <a:rPr lang="en-CA" sz="1400" dirty="0" smtClean="0"/>
+              <a:t>Class height</a:t>
+            </a:r>
+            <a:endParaRPr lang="en-CA" sz="1400" dirty="0"/>
+          </a:p>
+        </p:txBody>
+      </p:sp>
+      <p:sp>
+        <p:nvSpPr>
+          <p:cNvPr id="69" name="TextBox 68"/>
+          <p:cNvSpPr txBox="1"/>
+          <p:nvPr/>
+        </p:nvSpPr>
+        <p:spPr>
+          <a:xfrm>
+            <a:off x="3444525" y="5508841"/>
+            <a:ext cx="1373902" cy="276999"/>
+          </a:xfrm>
+          <a:prstGeom prst="rect">
+            <a:avLst/>
+          </a:prstGeom>
+          <a:noFill/>
+        </p:spPr>
+        <p:txBody>
+          <a:bodyPr wrap="none" rtlCol="0">
+            <a:spAutoFit/>
+          </a:bodyPr>
+          <a:lstStyle/>
+          <a:p>
+            <a:r>
+              <a:rPr lang="en-CA" sz="1200" dirty="0" smtClean="0"/>
+              <a:t>01.03 – merge files</a:t>
+            </a:r>
+            <a:endParaRPr lang="en-US" sz="1200" dirty="0"/>
+          </a:p>
+        </p:txBody>
+      </p:sp>
+      <p:sp>
+        <p:nvSpPr>
+          <p:cNvPr id="70" name="TextBox 69"/>
+          <p:cNvSpPr txBox="1"/>
+          <p:nvPr/>
+        </p:nvSpPr>
+        <p:spPr>
+          <a:xfrm>
+            <a:off x="6083808" y="1194582"/>
+            <a:ext cx="684803" cy="276999"/>
+          </a:xfrm>
+          <a:prstGeom prst="rect">
+            <a:avLst/>
+          </a:prstGeom>
+          <a:noFill/>
+        </p:spPr>
+        <p:txBody>
+          <a:bodyPr wrap="none" rtlCol="0">
+            <a:spAutoFit/>
+          </a:bodyPr>
+          <a:lstStyle/>
+          <a:p>
+            <a:r>
+              <a:rPr lang="en-CA" sz="1200" dirty="0" smtClean="0"/>
+              <a:t>02.01 – </a:t>
+            </a:r>
+            <a:endParaRPr lang="en-US" sz="1200" dirty="0"/>
+          </a:p>
+        </p:txBody>
+      </p:sp>
+      <p:sp>
+        <p:nvSpPr>
+          <p:cNvPr id="38" name="TextBox 37"/>
+          <p:cNvSpPr txBox="1"/>
+          <p:nvPr/>
+        </p:nvSpPr>
+        <p:spPr>
+          <a:xfrm>
+            <a:off x="6242147" y="4891301"/>
+            <a:ext cx="1926553" cy="523220"/>
+          </a:xfrm>
+          <a:prstGeom prst="rect">
+            <a:avLst/>
+          </a:prstGeom>
+          <a:noFill/>
+          <a:ln>
+            <a:solidFill>
+              <a:srgbClr val="935C2F"/>
+            </a:solidFill>
+          </a:ln>
+        </p:spPr>
+        <p:txBody>
+          <a:bodyPr wrap="square" rtlCol="0">
+            <a:spAutoFit/>
+          </a:bodyPr>
+          <a:lstStyle/>
+          <a:p>
+            <a:pPr marL="285750" indent="-285750">
+              <a:buFont typeface="Arial" panose="020B0604020202020204" pitchFamily="34" charset="0"/>
+              <a:buChar char="•"/>
+            </a:pPr>
+            <a:r>
+              <a:rPr lang="en-CA" sz="1400" dirty="0" smtClean="0"/>
+              <a:t>Filter for temporal misalignment</a:t>
+            </a:r>
+          </a:p>
+        </p:txBody>
+      </p:sp>
+      <p:sp>
+        <p:nvSpPr>
+          <p:cNvPr id="49" name="TextBox 48"/>
+          <p:cNvSpPr txBox="1"/>
+          <p:nvPr/>
+        </p:nvSpPr>
+        <p:spPr>
+          <a:xfrm>
+            <a:off x="6249526" y="4654439"/>
+            <a:ext cx="684803" cy="276999"/>
+          </a:xfrm>
+          <a:prstGeom prst="rect">
+            <a:avLst/>
+          </a:prstGeom>
+          <a:noFill/>
+        </p:spPr>
+        <p:txBody>
+          <a:bodyPr wrap="none" rtlCol="0">
+            <a:spAutoFit/>
+          </a:bodyPr>
+          <a:lstStyle/>
+          <a:p>
+            <a:r>
+              <a:rPr lang="en-CA" sz="1200" dirty="0" smtClean="0"/>
+              <a:t>02.02 – </a:t>
+            </a:r>
+            <a:endParaRPr lang="en-US" sz="1200" dirty="0"/>
+          </a:p>
+        </p:txBody>
+      </p:sp>
+      <p:sp>
+        <p:nvSpPr>
+          <p:cNvPr id="50" name="TextBox 49"/>
+          <p:cNvSpPr txBox="1"/>
+          <p:nvPr/>
+        </p:nvSpPr>
+        <p:spPr>
+          <a:xfrm>
+            <a:off x="6329090" y="5642930"/>
+            <a:ext cx="1926553" cy="523220"/>
+          </a:xfrm>
+          <a:prstGeom prst="rect">
+            <a:avLst/>
+          </a:prstGeom>
+          <a:noFill/>
+          <a:ln>
+            <a:solidFill>
+              <a:srgbClr val="935C2F"/>
+            </a:solidFill>
+          </a:ln>
+        </p:spPr>
+        <p:txBody>
+          <a:bodyPr wrap="square" rtlCol="0">
+            <a:spAutoFit/>
+          </a:bodyPr>
+          <a:lstStyle/>
+          <a:p>
+            <a:pPr marL="285750" indent="-285750">
+              <a:buFont typeface="Arial" panose="020B0604020202020204" pitchFamily="34" charset="0"/>
+              <a:buChar char="•"/>
+            </a:pPr>
+            <a:r>
+              <a:rPr lang="en-CA" sz="1400" dirty="0" smtClean="0"/>
+              <a:t>Filter any too close to stand edges</a:t>
+            </a:r>
+          </a:p>
+        </p:txBody>
+      </p:sp>
+      <p:sp>
+        <p:nvSpPr>
+          <p:cNvPr id="58" name="TextBox 57"/>
+          <p:cNvSpPr txBox="1"/>
+          <p:nvPr/>
+        </p:nvSpPr>
+        <p:spPr>
+          <a:xfrm>
+            <a:off x="6329090" y="5405710"/>
+            <a:ext cx="684803" cy="276999"/>
+          </a:xfrm>
+          <a:prstGeom prst="rect">
+            <a:avLst/>
+          </a:prstGeom>
+          <a:noFill/>
+        </p:spPr>
+        <p:txBody>
+          <a:bodyPr wrap="none" rtlCol="0">
+            <a:spAutoFit/>
+          </a:bodyPr>
+          <a:lstStyle/>
+          <a:p>
+            <a:r>
+              <a:rPr lang="en-CA" sz="1200" dirty="0" smtClean="0"/>
+              <a:t>02.03 – </a:t>
+            </a:r>
+            <a:endParaRPr lang="en-US" sz="1200" dirty="0"/>
+          </a:p>
+        </p:txBody>
+      </p:sp>
+    </p:spTree>
+    <p:extLst>
+      <p:ext uri="{BB962C8B-B14F-4D97-AF65-F5344CB8AC3E}">
+        <p14:creationId xmlns:p14="http://schemas.microsoft.com/office/powerpoint/2010/main" val="2727551187"/>
       </p:ext>
     </p:extLst>
   </p:cSld>

</xml_diff>

<commit_message>
re-added simpler offset; reran BRT to gen 1st set of preds
</commit_message>
<xml_diff>
--- a/VRI_bird_data_scenarios.pptx
+++ b/VRI_bird_data_scenarios.pptx
@@ -13,7 +13,7 @@
     <p:sldId id="262" r:id="rId7"/>
   </p:sldIdLst>
   <p:sldSz cx="12192000" cy="6858000"/>
-  <p:notesSz cx="6858000" cy="9144000"/>
+  <p:notesSz cx="7023100" cy="9309100"/>
   <p:defaultTextStyle>
     <a:defPPr>
       <a:defRPr lang="en-US"/>
@@ -248,7 +248,7 @@
           <a:p>
             <a:fld id="{2D5072A0-6F4A-496D-BC20-1C16D5D961A8}" type="datetimeFigureOut">
               <a:rPr lang="en-US" smtClean="0"/>
-              <a:t>1/8/2018</a:t>
+              <a:t>1/9/2018</a:t>
             </a:fld>
             <a:endParaRPr lang="en-US"/>
           </a:p>
@@ -418,7 +418,7 @@
           <a:p>
             <a:fld id="{2D5072A0-6F4A-496D-BC20-1C16D5D961A8}" type="datetimeFigureOut">
               <a:rPr lang="en-US" smtClean="0"/>
-              <a:t>1/8/2018</a:t>
+              <a:t>1/9/2018</a:t>
             </a:fld>
             <a:endParaRPr lang="en-US"/>
           </a:p>
@@ -598,7 +598,7 @@
           <a:p>
             <a:fld id="{2D5072A0-6F4A-496D-BC20-1C16D5D961A8}" type="datetimeFigureOut">
               <a:rPr lang="en-US" smtClean="0"/>
-              <a:t>1/8/2018</a:t>
+              <a:t>1/9/2018</a:t>
             </a:fld>
             <a:endParaRPr lang="en-US"/>
           </a:p>
@@ -768,7 +768,7 @@
           <a:p>
             <a:fld id="{2D5072A0-6F4A-496D-BC20-1C16D5D961A8}" type="datetimeFigureOut">
               <a:rPr lang="en-US" smtClean="0"/>
-              <a:t>1/8/2018</a:t>
+              <a:t>1/9/2018</a:t>
             </a:fld>
             <a:endParaRPr lang="en-US"/>
           </a:p>
@@ -1014,7 +1014,7 @@
           <a:p>
             <a:fld id="{2D5072A0-6F4A-496D-BC20-1C16D5D961A8}" type="datetimeFigureOut">
               <a:rPr lang="en-US" smtClean="0"/>
-              <a:t>1/8/2018</a:t>
+              <a:t>1/9/2018</a:t>
             </a:fld>
             <a:endParaRPr lang="en-US"/>
           </a:p>
@@ -1246,7 +1246,7 @@
           <a:p>
             <a:fld id="{2D5072A0-6F4A-496D-BC20-1C16D5D961A8}" type="datetimeFigureOut">
               <a:rPr lang="en-US" smtClean="0"/>
-              <a:t>1/8/2018</a:t>
+              <a:t>1/9/2018</a:t>
             </a:fld>
             <a:endParaRPr lang="en-US"/>
           </a:p>
@@ -1613,7 +1613,7 @@
           <a:p>
             <a:fld id="{2D5072A0-6F4A-496D-BC20-1C16D5D961A8}" type="datetimeFigureOut">
               <a:rPr lang="en-US" smtClean="0"/>
-              <a:t>1/8/2018</a:t>
+              <a:t>1/9/2018</a:t>
             </a:fld>
             <a:endParaRPr lang="en-US"/>
           </a:p>
@@ -1731,7 +1731,7 @@
           <a:p>
             <a:fld id="{2D5072A0-6F4A-496D-BC20-1C16D5D961A8}" type="datetimeFigureOut">
               <a:rPr lang="en-US" smtClean="0"/>
-              <a:t>1/8/2018</a:t>
+              <a:t>1/9/2018</a:t>
             </a:fld>
             <a:endParaRPr lang="en-US"/>
           </a:p>
@@ -1826,7 +1826,7 @@
           <a:p>
             <a:fld id="{2D5072A0-6F4A-496D-BC20-1C16D5D961A8}" type="datetimeFigureOut">
               <a:rPr lang="en-US" smtClean="0"/>
-              <a:t>1/8/2018</a:t>
+              <a:t>1/9/2018</a:t>
             </a:fld>
             <a:endParaRPr lang="en-US"/>
           </a:p>
@@ -2103,7 +2103,7 @@
           <a:p>
             <a:fld id="{2D5072A0-6F4A-496D-BC20-1C16D5D961A8}" type="datetimeFigureOut">
               <a:rPr lang="en-US" smtClean="0"/>
-              <a:t>1/8/2018</a:t>
+              <a:t>1/9/2018</a:t>
             </a:fld>
             <a:endParaRPr lang="en-US"/>
           </a:p>
@@ -2356,7 +2356,7 @@
           <a:p>
             <a:fld id="{2D5072A0-6F4A-496D-BC20-1C16D5D961A8}" type="datetimeFigureOut">
               <a:rPr lang="en-US" smtClean="0"/>
-              <a:t>1/8/2018</a:t>
+              <a:t>1/9/2018</a:t>
             </a:fld>
             <a:endParaRPr lang="en-US"/>
           </a:p>
@@ -2569,7 +2569,7 @@
           <a:p>
             <a:fld id="{2D5072A0-6F4A-496D-BC20-1C16D5D961A8}" type="datetimeFigureOut">
               <a:rPr lang="en-US" smtClean="0"/>
-              <a:t>1/8/2018</a:t>
+              <a:t>1/9/2018</a:t>
             </a:fld>
             <a:endParaRPr lang="en-US"/>
           </a:p>
@@ -5847,11 +5847,7 @@
             </a:pPr>
             <a:r>
               <a:rPr lang="en-US" sz="1400" dirty="0" smtClean="0"/>
-              <a:t>Look for &amp; eliminate </a:t>
-            </a:r>
-            <a:r>
-              <a:rPr lang="en-US" sz="1400" dirty="0" smtClean="0"/>
-              <a:t>duplicates</a:t>
+              <a:t>Look for &amp; eliminate duplicates</a:t>
             </a:r>
           </a:p>
           <a:p>
@@ -6011,7 +6007,7 @@
         </p:nvSpPr>
         <p:spPr>
           <a:xfrm>
-            <a:off x="2210070" y="76205"/>
+            <a:off x="3082906" y="76205"/>
             <a:ext cx="3423046" cy="889462"/>
           </a:xfrm>
           <a:prstGeom prst="rect">
@@ -6156,7 +6152,7 @@
         </p:nvSpPr>
         <p:spPr>
           <a:xfrm>
-            <a:off x="4308066" y="1339364"/>
+            <a:off x="5180902" y="1339364"/>
             <a:ext cx="1325050" cy="954107"/>
           </a:xfrm>
           <a:prstGeom prst="rect">
@@ -6209,7 +6205,7 @@
         </p:nvCxnSpPr>
         <p:spPr>
           <a:xfrm rot="16200000" flipH="1">
-            <a:off x="1475311" y="2029859"/>
+            <a:off x="2348147" y="2029859"/>
             <a:ext cx="1684256" cy="139938"/>
           </a:xfrm>
           <a:prstGeom prst="bentConnector3">
@@ -6247,7 +6243,7 @@
         </p:nvCxnSpPr>
         <p:spPr>
           <a:xfrm rot="16200000" flipH="1">
-            <a:off x="2267307" y="3712311"/>
+            <a:off x="3140143" y="3712311"/>
             <a:ext cx="658632" cy="149640"/>
           </a:xfrm>
           <a:prstGeom prst="bentConnector3">
@@ -6285,7 +6281,7 @@
         </p:nvSpPr>
         <p:spPr>
           <a:xfrm>
-            <a:off x="2433130" y="2719151"/>
+            <a:off x="3305966" y="2719151"/>
             <a:ext cx="1578443" cy="738664"/>
           </a:xfrm>
           <a:prstGeom prst="rect">
@@ -6323,7 +6319,7 @@
         </p:nvSpPr>
         <p:spPr>
           <a:xfrm>
-            <a:off x="5798187" y="97868"/>
+            <a:off x="7851367" y="97868"/>
             <a:ext cx="1886989" cy="889462"/>
           </a:xfrm>
           <a:prstGeom prst="rect">
@@ -6367,7 +6363,7 @@
         </p:nvCxnSpPr>
         <p:spPr>
           <a:xfrm rot="16200000" flipH="1">
-            <a:off x="5762858" y="1226322"/>
+            <a:off x="7816038" y="1226322"/>
             <a:ext cx="581894" cy="103912"/>
           </a:xfrm>
           <a:prstGeom prst="bentConnector3">
@@ -6405,7 +6401,7 @@
         </p:nvSpPr>
         <p:spPr>
           <a:xfrm>
-            <a:off x="6105761" y="1730561"/>
+            <a:off x="8158941" y="1730561"/>
             <a:ext cx="2062939" cy="2893100"/>
           </a:xfrm>
           <a:prstGeom prst="rect">
@@ -6481,7 +6477,7 @@
         </p:nvCxnSpPr>
         <p:spPr>
           <a:xfrm rot="16200000" flipH="1">
-            <a:off x="5967827" y="4811743"/>
+            <a:off x="8021007" y="4811743"/>
             <a:ext cx="457200" cy="91440"/>
           </a:xfrm>
           <a:prstGeom prst="bentConnector3">
@@ -6519,7 +6515,7 @@
         </p:nvSpPr>
         <p:spPr>
           <a:xfrm>
-            <a:off x="6105761" y="1422784"/>
+            <a:off x="8158941" y="1422784"/>
             <a:ext cx="2062939" cy="307777"/>
           </a:xfrm>
           <a:prstGeom prst="rect">
@@ -6559,7 +6555,7 @@
         </p:nvSpPr>
         <p:spPr>
           <a:xfrm>
-            <a:off x="2445115" y="1114043"/>
+            <a:off x="3317951" y="1114043"/>
             <a:ext cx="1351652" cy="276999"/>
           </a:xfrm>
           <a:prstGeom prst="rect">
@@ -6629,7 +6625,7 @@
         </p:nvCxnSpPr>
         <p:spPr>
           <a:xfrm rot="16200000" flipH="1">
-            <a:off x="3782931" y="1291283"/>
+            <a:off x="4655767" y="1291283"/>
             <a:ext cx="865998" cy="184272"/>
           </a:xfrm>
           <a:prstGeom prst="bentConnector2">
@@ -6665,7 +6661,7 @@
         </p:nvSpPr>
         <p:spPr>
           <a:xfrm>
-            <a:off x="2433130" y="1339364"/>
+            <a:off x="3305966" y="1339364"/>
             <a:ext cx="1578443" cy="954107"/>
           </a:xfrm>
           <a:prstGeom prst="rect">
@@ -6720,7 +6716,7 @@
         </p:nvCxnSpPr>
         <p:spPr>
           <a:xfrm rot="16200000" flipH="1">
-            <a:off x="1907995" y="1291283"/>
+            <a:off x="2780831" y="1291283"/>
             <a:ext cx="865998" cy="184272"/>
           </a:xfrm>
           <a:prstGeom prst="bentConnector2">
@@ -6756,7 +6752,7 @@
         </p:nvSpPr>
         <p:spPr>
           <a:xfrm>
-            <a:off x="4252904" y="1103426"/>
+            <a:off x="5125740" y="1103426"/>
             <a:ext cx="1342740" cy="276999"/>
           </a:xfrm>
           <a:prstGeom prst="rect">
@@ -6786,7 +6782,7 @@
         </p:nvSpPr>
         <p:spPr>
           <a:xfrm>
-            <a:off x="2704895" y="3842946"/>
+            <a:off x="3577731" y="3842946"/>
             <a:ext cx="1581011" cy="738664"/>
           </a:xfrm>
           <a:prstGeom prst="rect">
@@ -6824,7 +6820,7 @@
         </p:nvSpPr>
         <p:spPr>
           <a:xfrm>
-            <a:off x="2704895" y="4783235"/>
+            <a:off x="3577731" y="4783235"/>
             <a:ext cx="1581011" cy="738664"/>
           </a:xfrm>
           <a:prstGeom prst="rect">
@@ -6871,7 +6867,7 @@
         </p:nvCxnSpPr>
         <p:spPr>
           <a:xfrm rot="16200000" flipH="1">
-            <a:off x="1749644" y="4240470"/>
+            <a:off x="2622480" y="4240470"/>
             <a:ext cx="1684256" cy="139938"/>
           </a:xfrm>
           <a:prstGeom prst="bentConnector3">
@@ -6909,7 +6905,7 @@
         </p:nvSpPr>
         <p:spPr>
           <a:xfrm>
-            <a:off x="2430562" y="2498617"/>
+            <a:off x="3303398" y="2498617"/>
             <a:ext cx="1560299" cy="461665"/>
           </a:xfrm>
           <a:prstGeom prst="rect">
@@ -6949,7 +6945,7 @@
         </p:nvSpPr>
         <p:spPr>
           <a:xfrm>
-            <a:off x="2704895" y="3624363"/>
+            <a:off x="3577731" y="3624363"/>
             <a:ext cx="1418145" cy="276999"/>
           </a:xfrm>
           <a:prstGeom prst="rect">
@@ -6979,7 +6975,7 @@
         </p:nvSpPr>
         <p:spPr>
           <a:xfrm>
-            <a:off x="2704895" y="4566602"/>
+            <a:off x="3577731" y="4566602"/>
             <a:ext cx="1402628" cy="276999"/>
           </a:xfrm>
           <a:prstGeom prst="rect">
@@ -7009,7 +7005,7 @@
         </p:nvCxnSpPr>
         <p:spPr>
           <a:xfrm rot="16200000" flipH="1">
-            <a:off x="2893035" y="5788156"/>
+            <a:off x="3765871" y="5788156"/>
             <a:ext cx="658632" cy="149640"/>
           </a:xfrm>
           <a:prstGeom prst="bentConnector3">
@@ -7047,7 +7043,7 @@
         </p:nvCxnSpPr>
         <p:spPr>
           <a:xfrm rot="5400000">
-            <a:off x="3437448" y="4094365"/>
+            <a:off x="4310284" y="4094365"/>
             <a:ext cx="3957791" cy="358602"/>
           </a:xfrm>
           <a:prstGeom prst="bentConnector3">
@@ -7085,7 +7081,7 @@
         </p:nvSpPr>
         <p:spPr>
           <a:xfrm>
-            <a:off x="3317017" y="5719914"/>
+            <a:off x="4189853" y="5719914"/>
             <a:ext cx="1882554" cy="954107"/>
           </a:xfrm>
           <a:prstGeom prst="rect">
@@ -7154,7 +7150,7 @@
         </p:nvSpPr>
         <p:spPr>
           <a:xfrm>
-            <a:off x="3444525" y="5508841"/>
+            <a:off x="4317361" y="5508841"/>
             <a:ext cx="1373902" cy="276999"/>
           </a:xfrm>
           <a:prstGeom prst="rect">
@@ -7184,7 +7180,7 @@
         </p:nvSpPr>
         <p:spPr>
           <a:xfrm>
-            <a:off x="6083808" y="1194582"/>
+            <a:off x="8136988" y="1194582"/>
             <a:ext cx="684803" cy="276999"/>
           </a:xfrm>
           <a:prstGeom prst="rect">
@@ -7214,7 +7210,7 @@
         </p:nvSpPr>
         <p:spPr>
           <a:xfrm>
-            <a:off x="6242147" y="4891301"/>
+            <a:off x="8295327" y="4891301"/>
             <a:ext cx="1926553" cy="523220"/>
           </a:xfrm>
           <a:prstGeom prst="rect">
@@ -7252,7 +7248,7 @@
         </p:nvSpPr>
         <p:spPr>
           <a:xfrm>
-            <a:off x="6249526" y="4654439"/>
+            <a:off x="8302706" y="4654439"/>
             <a:ext cx="684803" cy="276999"/>
           </a:xfrm>
           <a:prstGeom prst="rect">
@@ -7282,7 +7278,7 @@
         </p:nvSpPr>
         <p:spPr>
           <a:xfrm>
-            <a:off x="6329090" y="5642930"/>
+            <a:off x="8382270" y="5642930"/>
             <a:ext cx="1926553" cy="523220"/>
           </a:xfrm>
           <a:prstGeom prst="rect">
@@ -7320,7 +7316,7 @@
         </p:nvSpPr>
         <p:spPr>
           <a:xfrm>
-            <a:off x="6329090" y="5405710"/>
+            <a:off x="8382270" y="5405710"/>
             <a:ext cx="684803" cy="276999"/>
           </a:xfrm>
           <a:prstGeom prst="rect">

</xml_diff>